<commit_message>
add missing @jakebolewski acknowledgement
</commit_message>
<xml_diff>
--- a/Julia@EuroSciPy.pptx
+++ b/Julia@EuroSciPy.pptx
@@ -10514,11 +10514,7 @@
             </a:br>
             <a:r>
               <a:rPr lang="en-US" dirty="0" smtClean="0"/>
-              <a:t>you don’t lose your Python stuff</a:t>
-            </a:r>
-            <a:r>
-              <a:rPr lang="en-US" dirty="0" smtClean="0"/>
-              <a:t>.</a:t>
+              <a:t>you don’t lose your Python stuff.</a:t>
             </a:r>
             <a:br>
               <a:rPr lang="en-US" dirty="0" smtClean="0"/>
@@ -10534,10 +10530,6 @@
               <a:rPr lang="en-US" dirty="0" smtClean="0"/>
               <a:t>New languages are always a risk…</a:t>
             </a:r>
-            <a:r>
-              <a:rPr lang="en-US" dirty="0" smtClean="0"/>
-              <a:t/>
-            </a:r>
             <a:br>
               <a:rPr lang="en-US" dirty="0" smtClean="0"/>
             </a:br>
@@ -10550,19 +10542,7 @@
             </a:br>
             <a:r>
               <a:rPr lang="en-US" dirty="0" smtClean="0"/>
-              <a:t>…bu</a:t>
-            </a:r>
-            <a:r>
-              <a:rPr lang="en-US" dirty="0" smtClean="0"/>
-              <a:t>t m</a:t>
-            </a:r>
-            <a:r>
-              <a:rPr lang="en-US" dirty="0" smtClean="0"/>
-              <a:t>aybe </a:t>
-            </a:r>
-            <a:r>
-              <a:rPr lang="en-US" dirty="0" smtClean="0"/>
-              <a:t>not doomed?</a:t>
+              <a:t>…but maybe not doomed?</a:t>
             </a:r>
             <a:endParaRPr lang="en-US" dirty="0"/>
           </a:p>
@@ -12104,15 +12084,15 @@
         </p:nvSpPr>
         <p:spPr>
           <a:xfrm>
-            <a:off x="7779732" y="5556822"/>
-            <a:ext cx="1267444" cy="1200328"/>
+            <a:off x="6896205" y="5084799"/>
+            <a:ext cx="2247795" cy="830997"/>
           </a:xfrm>
           <a:prstGeom prst="rect">
             <a:avLst/>
           </a:prstGeom>
         </p:spPr>
         <p:txBody>
-          <a:bodyPr wrap="none">
+          <a:bodyPr wrap="square">
             <a:spAutoFit/>
           </a:bodyPr>
           <a:lstStyle/>
@@ -12121,7 +12101,7 @@
             <a:r>
               <a:rPr lang="en-US" sz="2400" dirty="0" smtClean="0">
                 <a:solidFill>
-                  <a:srgbClr val="000000"/>
+                  <a:srgbClr val="FF0000"/>
                 </a:solidFill>
               </a:rPr>
               <a:t>&amp; </a:t>
@@ -12142,8 +12122,6 @@
               </a:rPr>
               <a:t> </a:t>
             </a:r>
-          </a:p>
-          <a:p>
             <a:r>
               <a:rPr lang="en-US" sz="2400" dirty="0" err="1" smtClean="0">
                 <a:solidFill>
@@ -12159,9 +12137,10 @@
             </a:endParaRPr>
           </a:p>
           <a:p>
+            <a:pPr algn="ctr"/>
             <a:r>
               <a:rPr lang="en-US" sz="2400" dirty="0" smtClean="0"/>
-              <a:t> (</a:t>
+              <a:t>(</a:t>
             </a:r>
             <a:r>
               <a:rPr lang="en-US" sz="2400" dirty="0" err="1" smtClean="0"/>
@@ -12170,6 +12149,57 @@
             <a:r>
               <a:rPr lang="en-US" sz="2400" dirty="0" smtClean="0"/>
               <a:t>) </a:t>
+            </a:r>
+            <a:endParaRPr lang="en-US" sz="2400" dirty="0"/>
+          </a:p>
+        </p:txBody>
+      </p:sp>
+      <p:sp>
+        <p:nvSpPr>
+          <p:cNvPr id="5" name="TextBox 4"/>
+          <p:cNvSpPr txBox="1"/>
+          <p:nvPr/>
+        </p:nvSpPr>
+        <p:spPr>
+          <a:xfrm>
+            <a:off x="6944227" y="5921383"/>
+            <a:ext cx="2176798" cy="830997"/>
+          </a:xfrm>
+          <a:prstGeom prst="rect">
+            <a:avLst/>
+          </a:prstGeom>
+          <a:noFill/>
+        </p:spPr>
+        <p:txBody>
+          <a:bodyPr wrap="none" rtlCol="0">
+            <a:spAutoFit/>
+          </a:bodyPr>
+          <a:lstStyle/>
+          <a:p>
+            <a:pPr algn="ctr"/>
+            <a:r>
+              <a:rPr lang="en-US" sz="2400" dirty="0" smtClean="0"/>
+              <a:t>&amp; Jake </a:t>
+            </a:r>
+            <a:r>
+              <a:rPr lang="en-US" sz="2400" dirty="0" err="1" smtClean="0"/>
+              <a:t>Bolewski</a:t>
+            </a:r>
+            <a:endParaRPr lang="en-US" sz="2400" dirty="0" smtClean="0"/>
+          </a:p>
+          <a:p>
+            <a:pPr algn="ctr"/>
+            <a:r>
+              <a:rPr lang="en-US" sz="2400" dirty="0" smtClean="0"/>
+              <a:t>(</a:t>
+            </a:r>
+            <a:r>
+              <a:rPr lang="en-US" sz="2400" dirty="0" err="1" smtClean="0"/>
+              <a:t>pyjulia</a:t>
+            </a:r>
+            <a:r>
+              <a:rPr lang="en-US" sz="2400" dirty="0" smtClean="0"/>
+              <a:t>)</a:t>
             </a:r>
             <a:endParaRPr lang="en-US" sz="2400" dirty="0"/>
           </a:p>

</xml_diff>